<commit_message>
Update for paper final
All files used for analyses of experiments 1 and 2 and the microbial community succession, as they appear in the Microbiome paper.
</commit_message>
<xml_diff>
--- a/CommunityAnalysis/PICRUSt/Chitin degradation.pptx
+++ b/CommunityAnalysis/PICRUSt/Chitin degradation.pptx
@@ -259,7 +259,7 @@
           <a:p>
             <a:fld id="{200E86A3-3124-594A-B1A4-7CDA10ACB0D3}" type="datetimeFigureOut">
               <a:rPr lang="en-US" smtClean="0"/>
-              <a:t>10/21/18</a:t>
+              <a:t>11/14/18</a:t>
             </a:fld>
             <a:endParaRPr lang="en-US"/>
           </a:p>
@@ -457,7 +457,7 @@
           <a:p>
             <a:fld id="{200E86A3-3124-594A-B1A4-7CDA10ACB0D3}" type="datetimeFigureOut">
               <a:rPr lang="en-US" smtClean="0"/>
-              <a:t>10/21/18</a:t>
+              <a:t>11/14/18</a:t>
             </a:fld>
             <a:endParaRPr lang="en-US"/>
           </a:p>
@@ -665,7 +665,7 @@
           <a:p>
             <a:fld id="{200E86A3-3124-594A-B1A4-7CDA10ACB0D3}" type="datetimeFigureOut">
               <a:rPr lang="en-US" smtClean="0"/>
-              <a:t>10/21/18</a:t>
+              <a:t>11/14/18</a:t>
             </a:fld>
             <a:endParaRPr lang="en-US"/>
           </a:p>
@@ -863,7 +863,7 @@
           <a:p>
             <a:fld id="{200E86A3-3124-594A-B1A4-7CDA10ACB0D3}" type="datetimeFigureOut">
               <a:rPr lang="en-US" smtClean="0"/>
-              <a:t>10/21/18</a:t>
+              <a:t>11/14/18</a:t>
             </a:fld>
             <a:endParaRPr lang="en-US"/>
           </a:p>
@@ -1138,7 +1138,7 @@
           <a:p>
             <a:fld id="{200E86A3-3124-594A-B1A4-7CDA10ACB0D3}" type="datetimeFigureOut">
               <a:rPr lang="en-US" smtClean="0"/>
-              <a:t>10/21/18</a:t>
+              <a:t>11/14/18</a:t>
             </a:fld>
             <a:endParaRPr lang="en-US"/>
           </a:p>
@@ -1403,7 +1403,7 @@
           <a:p>
             <a:fld id="{200E86A3-3124-594A-B1A4-7CDA10ACB0D3}" type="datetimeFigureOut">
               <a:rPr lang="en-US" smtClean="0"/>
-              <a:t>10/21/18</a:t>
+              <a:t>11/14/18</a:t>
             </a:fld>
             <a:endParaRPr lang="en-US"/>
           </a:p>
@@ -1815,7 +1815,7 @@
           <a:p>
             <a:fld id="{200E86A3-3124-594A-B1A4-7CDA10ACB0D3}" type="datetimeFigureOut">
               <a:rPr lang="en-US" smtClean="0"/>
-              <a:t>10/21/18</a:t>
+              <a:t>11/14/18</a:t>
             </a:fld>
             <a:endParaRPr lang="en-US"/>
           </a:p>
@@ -1956,7 +1956,7 @@
           <a:p>
             <a:fld id="{200E86A3-3124-594A-B1A4-7CDA10ACB0D3}" type="datetimeFigureOut">
               <a:rPr lang="en-US" smtClean="0"/>
-              <a:t>10/21/18</a:t>
+              <a:t>11/14/18</a:t>
             </a:fld>
             <a:endParaRPr lang="en-US"/>
           </a:p>
@@ -2069,7 +2069,7 @@
           <a:p>
             <a:fld id="{200E86A3-3124-594A-B1A4-7CDA10ACB0D3}" type="datetimeFigureOut">
               <a:rPr lang="en-US" smtClean="0"/>
-              <a:t>10/21/18</a:t>
+              <a:t>11/14/18</a:t>
             </a:fld>
             <a:endParaRPr lang="en-US"/>
           </a:p>
@@ -2380,7 +2380,7 @@
           <a:p>
             <a:fld id="{200E86A3-3124-594A-B1A4-7CDA10ACB0D3}" type="datetimeFigureOut">
               <a:rPr lang="en-US" smtClean="0"/>
-              <a:t>10/21/18</a:t>
+              <a:t>11/14/18</a:t>
             </a:fld>
             <a:endParaRPr lang="en-US"/>
           </a:p>
@@ -2668,7 +2668,7 @@
           <a:p>
             <a:fld id="{200E86A3-3124-594A-B1A4-7CDA10ACB0D3}" type="datetimeFigureOut">
               <a:rPr lang="en-US" smtClean="0"/>
-              <a:t>10/21/18</a:t>
+              <a:t>11/14/18</a:t>
             </a:fld>
             <a:endParaRPr lang="en-US"/>
           </a:p>
@@ -2909,7 +2909,7 @@
           <a:p>
             <a:fld id="{200E86A3-3124-594A-B1A4-7CDA10ACB0D3}" type="datetimeFigureOut">
               <a:rPr lang="en-US" smtClean="0"/>
-              <a:t>10/21/18</a:t>
+              <a:t>11/14/18</a:t>
             </a:fld>
             <a:endParaRPr lang="en-US"/>
           </a:p>
@@ -3341,9 +3341,9 @@
         <p:grpSpPr>
           <a:xfrm>
             <a:off x="191069" y="286603"/>
-            <a:ext cx="12000931" cy="5992429"/>
+            <a:ext cx="11998979" cy="5292106"/>
             <a:chOff x="-109182" y="122830"/>
-            <a:chExt cx="12000931" cy="5992429"/>
+            <a:chExt cx="11998979" cy="5292106"/>
           </a:xfrm>
         </p:grpSpPr>
         <p:sp>
@@ -3542,7 +3542,7 @@
           </p:nvSpPr>
           <p:spPr>
             <a:xfrm>
-              <a:off x="387655" y="3328842"/>
+              <a:off x="387655" y="3080868"/>
               <a:ext cx="1800000" cy="614149"/>
             </a:xfrm>
             <a:prstGeom prst="rect">
@@ -3601,7 +3601,7 @@
           </p:nvSpPr>
           <p:spPr>
             <a:xfrm>
-              <a:off x="3358773" y="3328842"/>
+              <a:off x="3358773" y="3080868"/>
               <a:ext cx="1800000" cy="614149"/>
             </a:xfrm>
             <a:prstGeom prst="rect">
@@ -3673,7 +3673,7 @@
           </p:nvSpPr>
           <p:spPr>
             <a:xfrm>
-              <a:off x="6329891" y="3328842"/>
+              <a:off x="6329891" y="3080868"/>
               <a:ext cx="1800000" cy="614149"/>
             </a:xfrm>
             <a:prstGeom prst="rect">
@@ -3791,7 +3791,7 @@
           </p:nvSpPr>
           <p:spPr>
             <a:xfrm>
-              <a:off x="9301009" y="3328842"/>
+              <a:off x="9301009" y="3080868"/>
               <a:ext cx="1800000" cy="614149"/>
             </a:xfrm>
             <a:prstGeom prst="rect">
@@ -3850,7 +3850,7 @@
           </p:nvSpPr>
           <p:spPr>
             <a:xfrm>
-              <a:off x="9301009" y="5501110"/>
+              <a:off x="9301009" y="4800787"/>
               <a:ext cx="1800000" cy="614149"/>
             </a:xfrm>
             <a:prstGeom prst="rect">
@@ -3913,7 +3913,7 @@
           <p:spPr>
             <a:xfrm>
               <a:off x="1287655" y="1770724"/>
-              <a:ext cx="0" cy="1558118"/>
+              <a:ext cx="0" cy="1310144"/>
             </a:xfrm>
             <a:prstGeom prst="straightConnector1">
               <a:avLst/>
@@ -4094,7 +4094,7 @@
           </p:nvCxnSpPr>
           <p:spPr>
             <a:xfrm>
-              <a:off x="2187655" y="3635917"/>
+              <a:off x="2187655" y="3387943"/>
               <a:ext cx="1171118" cy="0"/>
             </a:xfrm>
             <a:prstGeom prst="straightConnector1">
@@ -4142,7 +4142,7 @@
           </p:nvCxnSpPr>
           <p:spPr>
             <a:xfrm>
-              <a:off x="5158773" y="3635917"/>
+              <a:off x="5158773" y="3387943"/>
               <a:ext cx="1171118" cy="0"/>
             </a:xfrm>
             <a:prstGeom prst="straightConnector1">
@@ -4190,7 +4190,7 @@
           </p:nvCxnSpPr>
           <p:spPr>
             <a:xfrm>
-              <a:off x="8129891" y="3635917"/>
+              <a:off x="8129891" y="3387943"/>
               <a:ext cx="1171118" cy="0"/>
             </a:xfrm>
             <a:prstGeom prst="straightConnector1">
@@ -4230,14 +4230,13 @@
             <p:cNvCxnSpPr>
               <a:cxnSpLocks/>
               <a:stCxn id="11" idx="2"/>
-              <a:endCxn id="12" idx="0"/>
             </p:cNvCxnSpPr>
             <p:nvPr/>
           </p:nvCxnSpPr>
           <p:spPr>
             <a:xfrm>
               <a:off x="10201009" y="1770724"/>
-              <a:ext cx="0" cy="1558118"/>
+              <a:ext cx="0" cy="1286375"/>
             </a:xfrm>
             <a:prstGeom prst="straightConnector1">
               <a:avLst/>
@@ -4273,13 +4272,16 @@
                 </a:ext>
               </a:extLst>
             </p:cNvPr>
-            <p:cNvCxnSpPr/>
+            <p:cNvCxnSpPr>
+              <a:cxnSpLocks/>
+              <a:endCxn id="10" idx="0"/>
+            </p:cNvCxnSpPr>
             <p:nvPr/>
           </p:nvCxnSpPr>
           <p:spPr>
             <a:xfrm>
               <a:off x="7229891" y="1770723"/>
-              <a:ext cx="0" cy="1558119"/>
+              <a:ext cx="0" cy="1310145"/>
             </a:xfrm>
             <a:prstGeom prst="straightConnector1">
               <a:avLst/>
@@ -4315,13 +4317,16 @@
                 </a:ext>
               </a:extLst>
             </p:cNvPr>
-            <p:cNvCxnSpPr/>
+            <p:cNvCxnSpPr>
+              <a:cxnSpLocks/>
+              <a:endCxn id="13" idx="0"/>
+            </p:cNvCxnSpPr>
             <p:nvPr/>
           </p:nvCxnSpPr>
           <p:spPr>
             <a:xfrm>
-              <a:off x="10201009" y="3942991"/>
-              <a:ext cx="0" cy="1558119"/>
+              <a:off x="10201009" y="3710519"/>
+              <a:ext cx="0" cy="1090268"/>
             </a:xfrm>
             <a:prstGeom prst="straightConnector1">
               <a:avLst/>
@@ -4530,7 +4535,7 @@
                     <a:srgbClr val="92D050"/>
                   </a:solidFill>
                 </a:rPr>
-                <a:t>K01183, Fig. S10</a:t>
+                <a:t>K01183</a:t>
               </a:r>
             </a:p>
             <a:p>
@@ -4598,7 +4603,7 @@
                     <a:srgbClr val="92D050"/>
                   </a:solidFill>
                 </a:rPr>
-                <a:t>K01183, Fig. S10</a:t>
+                <a:t>K01183</a:t>
               </a:r>
             </a:p>
             <a:p>
@@ -4614,8 +4619,8 @@
             </a:p>
           </p:txBody>
         </p:sp>
-        <mc:AlternateContent xmlns:mc="http://schemas.openxmlformats.org/markup-compatibility/2006" xmlns:a14="http://schemas.microsoft.com/office/drawing/2010/main">
-          <mc:Choice Requires="a14">
+        <mc:AlternateContent xmlns:mc="http://schemas.openxmlformats.org/markup-compatibility/2006">
+          <mc:Choice xmlns:a14="http://schemas.microsoft.com/office/drawing/2010/main" Requires="a14">
             <p:sp>
               <p:nvSpPr>
                 <p:cNvPr id="46" name="Rectangle 45">
@@ -4683,21 +4688,17 @@
                         </a:schemeClr>
                       </a:solidFill>
                     </a:rPr>
-                    <a:t>K12373, </a:t>
+                    <a:t>K12373</a:t>
                   </a:r>
-                </a:p>
-                <a:p>
-                  <a:pPr algn="ctr"/>
-                  <a:r>
-                    <a:rPr lang="en-US" sz="1600" dirty="0">
-                      <a:solidFill>
-                        <a:schemeClr val="accent6">
-                          <a:lumMod val="50000"/>
-                        </a:schemeClr>
-                      </a:solidFill>
-                    </a:rPr>
-                    <a:t>Fig. S12</a:t>
-                  </a:r>
+                  <a:endParaRPr lang="en-GB" sz="1600" b="1" i="0" dirty="0">
+                    <a:solidFill>
+                      <a:schemeClr val="accent6">
+                        <a:lumMod val="50000"/>
+                      </a:schemeClr>
+                    </a:solidFill>
+                    <a:latin typeface="Cambria Math" panose="02040503050406030204" pitchFamily="18" charset="0"/>
+                    <a:ea typeface="Cambria Math" panose="02040503050406030204" pitchFamily="18" charset="0"/>
+                  </a:endParaRPr>
                 </a:p>
                 <a:p>
                   <a:pPr algn="ctr"/>
@@ -4731,7 +4732,7 @@
               </p:txBody>
             </p:sp>
           </mc:Choice>
-          <mc:Fallback xmlns="">
+          <mc:Fallback>
             <p:sp>
               <p:nvSpPr>
                 <p:cNvPr id="46" name="Rectangle 45">
@@ -4757,7 +4758,7 @@
                 <a:blipFill>
                   <a:blip r:embed="rId2"/>
                   <a:stretch>
-                    <a:fillRect t="-4082" b="-9184"/>
+                    <a:fillRect/>
                   </a:stretch>
                 </a:blipFill>
                 <a:ln>
@@ -4831,7 +4832,7 @@
                     <a:srgbClr val="FFC000"/>
                   </a:solidFill>
                 </a:rPr>
-                <a:t>K01452, Fig. S11</a:t>
+                <a:t>K01452</a:t>
               </a:r>
             </a:p>
             <a:p>
@@ -4861,7 +4862,7 @@
           </p:nvSpPr>
           <p:spPr>
             <a:xfrm>
-              <a:off x="2008997" y="3658755"/>
+              <a:off x="2008997" y="3410781"/>
               <a:ext cx="1472338" cy="791475"/>
             </a:xfrm>
             <a:prstGeom prst="rect">
@@ -4932,8 +4933,8 @@
             </a:p>
           </p:txBody>
         </p:sp>
-        <mc:AlternateContent xmlns:mc="http://schemas.openxmlformats.org/markup-compatibility/2006" xmlns:a14="http://schemas.microsoft.com/office/drawing/2010/main">
-          <mc:Choice Requires="a14">
+        <mc:AlternateContent xmlns:mc="http://schemas.openxmlformats.org/markup-compatibility/2006">
+          <mc:Choice xmlns:a14="http://schemas.microsoft.com/office/drawing/2010/main" Requires="a14">
             <p:sp>
               <p:nvSpPr>
                 <p:cNvPr id="49" name="Rectangle 48">
@@ -4948,7 +4949,7 @@
               </p:nvSpPr>
               <p:spPr>
                 <a:xfrm>
-                  <a:off x="4801138" y="3664178"/>
+                  <a:off x="4801138" y="3416204"/>
                   <a:ext cx="1795357" cy="1000723"/>
                 </a:xfrm>
                 <a:prstGeom prst="rect">
@@ -5046,7 +5047,7 @@
               </p:txBody>
             </p:sp>
           </mc:Choice>
-          <mc:Fallback xmlns="">
+          <mc:Fallback>
             <p:sp>
               <p:nvSpPr>
                 <p:cNvPr id="49" name="Rectangle 48">
@@ -5063,7 +5064,7 @@
               </p:nvSpPr>
               <p:spPr>
                 <a:xfrm>
-                  <a:off x="4801138" y="3664178"/>
+                  <a:off x="4801138" y="3416204"/>
                   <a:ext cx="1795357" cy="1000723"/>
                 </a:xfrm>
                 <a:prstGeom prst="rect">
@@ -5072,7 +5073,7 @@
                 <a:blipFill>
                   <a:blip r:embed="rId3"/>
                   <a:stretch>
-                    <a:fillRect t="-3750" b="-11250"/>
+                    <a:fillRect t="-5000" b="-10000"/>
                   </a:stretch>
                 </a:blipFill>
                 <a:ln>
@@ -5146,18 +5147,7 @@
                     <a:srgbClr val="FF0000"/>
                   </a:solidFill>
                 </a:rPr>
-                <a:t>K00884, </a:t>
-              </a:r>
-            </a:p>
-            <a:p>
-              <a:pPr algn="ctr"/>
-              <a:r>
-                <a:rPr lang="en-US" sz="1600" dirty="0">
-                  <a:solidFill>
-                    <a:srgbClr val="FF0000"/>
-                  </a:solidFill>
-                </a:rPr>
-                <a:t>Fig. S13</a:t>
+                <a:t>K00884</a:t>
               </a:r>
             </a:p>
             <a:p>
@@ -5187,7 +5177,7 @@
           </p:nvSpPr>
           <p:spPr>
             <a:xfrm>
-              <a:off x="10201009" y="2335919"/>
+              <a:off x="10199057" y="2242710"/>
               <a:ext cx="1690740" cy="427728"/>
             </a:xfrm>
             <a:prstGeom prst="rect">
@@ -5226,17 +5216,6 @@
                   </a:solidFill>
                 </a:rPr>
                 <a:t>K01443</a:t>
-              </a:r>
-            </a:p>
-            <a:p>
-              <a:pPr algn="ctr"/>
-              <a:r>
-                <a:rPr lang="en-US" sz="1600" dirty="0">
-                  <a:solidFill>
-                    <a:srgbClr val="FF0000"/>
-                  </a:solidFill>
-                </a:rPr>
-                <a:t>Fig. S13</a:t>
               </a:r>
             </a:p>
             <a:p>
@@ -5266,7 +5245,7 @@
           </p:nvSpPr>
           <p:spPr>
             <a:xfrm>
-              <a:off x="7977475" y="3658755"/>
+              <a:off x="7977475" y="3410781"/>
               <a:ext cx="1590137" cy="1535282"/>
             </a:xfrm>
             <a:prstGeom prst="rect">
@@ -5321,17 +5300,6 @@
             <a:p>
               <a:pPr algn="ctr"/>
               <a:r>
-                <a:rPr lang="en-US" sz="1600" dirty="0">
-                  <a:solidFill>
-                    <a:srgbClr val="FF0000"/>
-                  </a:solidFill>
-                </a:rPr>
-                <a:t>Fig. S13</a:t>
-              </a:r>
-            </a:p>
-            <a:p>
-              <a:pPr algn="ctr"/>
-              <a:r>
                 <a:rPr lang="en-US" sz="1600" b="1" dirty="0">
                   <a:solidFill>
                     <a:srgbClr val="FF0000"/>
@@ -5356,7 +5324,7 @@
           </p:nvSpPr>
           <p:spPr>
             <a:xfrm>
-              <a:off x="10199057" y="4508185"/>
+              <a:off x="10102246" y="4038687"/>
               <a:ext cx="1692692" cy="685851"/>
             </a:xfrm>
             <a:prstGeom prst="rect">
@@ -5394,7 +5362,7 @@
                     <a:srgbClr val="FF0000"/>
                   </a:solidFill>
                 </a:rPr>
-                <a:t>K02564, Fig. S13</a:t>
+                <a:t>K02564</a:t>
               </a:r>
             </a:p>
             <a:p>

</xml_diff>